<commit_message>
wait to run adaboost separately
</commit_message>
<xml_diff>
--- a/DataSciencePres.pptx
+++ b/DataSciencePres.pptx
@@ -16,11 +16,11 @@
     <p:sldId id="270" r:id="rId7"/>
     <p:sldId id="258" r:id="rId8"/>
     <p:sldId id="268" r:id="rId9"/>
-    <p:sldId id="269" r:id="rId10"/>
-    <p:sldId id="272" r:id="rId11"/>
-    <p:sldId id="271" r:id="rId12"/>
-    <p:sldId id="273" r:id="rId13"/>
-    <p:sldId id="274" r:id="rId14"/>
+    <p:sldId id="272" r:id="rId10"/>
+    <p:sldId id="271" r:id="rId11"/>
+    <p:sldId id="273" r:id="rId12"/>
+    <p:sldId id="274" r:id="rId13"/>
+    <p:sldId id="279" r:id="rId14"/>
     <p:sldId id="260" r:id="rId15"/>
     <p:sldId id="275" r:id="rId16"/>
     <p:sldId id="277" r:id="rId17"/>
@@ -3784,290 +3784,6 @@
       </p:grpSpPr>
       <p:sp>
         <p:nvSpPr>
-          <p:cNvPr id="7" name="Rectangle 6">
-            <a:extLst>
-              <a:ext uri="{FF2B5EF4-FFF2-40B4-BE49-F238E27FC236}">
-                <a16:creationId xmlns:a16="http://schemas.microsoft.com/office/drawing/2014/main" id="{AE314084-4AA0-A54B-AF91-603368B26EA0}"/>
-              </a:ext>
-            </a:extLst>
-          </p:cNvPr>
-          <p:cNvSpPr/>
-          <p:nvPr/>
-        </p:nvSpPr>
-        <p:spPr>
-          <a:xfrm>
-            <a:off x="420783" y="337307"/>
-            <a:ext cx="4051365" cy="523220"/>
-          </a:xfrm>
-          <a:prstGeom prst="rect">
-            <a:avLst/>
-          </a:prstGeom>
-        </p:spPr>
-        <p:txBody>
-          <a:bodyPr wrap="none">
-            <a:spAutoFit/>
-          </a:bodyPr>
-          <a:lstStyle/>
-          <a:p>
-            <a:pPr>
-              <a:spcAft>
-                <a:spcPts val="600"/>
-              </a:spcAft>
-            </a:pPr>
-            <a:r>
-              <a:rPr lang="en-US" sz="2800" b="1" dirty="0">
-                <a:solidFill>
-                  <a:srgbClr val="54AC5C"/>
-                </a:solidFill>
-              </a:rPr>
-              <a:t>Q1: Variants Classification</a:t>
-            </a:r>
-          </a:p>
-        </p:txBody>
-      </p:sp>
-      <p:cxnSp>
-        <p:nvCxnSpPr>
-          <p:cNvPr id="8" name="Straight Connector 7">
-            <a:extLst>
-              <a:ext uri="{FF2B5EF4-FFF2-40B4-BE49-F238E27FC236}">
-                <a16:creationId xmlns:a16="http://schemas.microsoft.com/office/drawing/2014/main" id="{1DFF1BA9-A783-624F-8B47-59877EDCC3C5}"/>
-              </a:ext>
-            </a:extLst>
-          </p:cNvPr>
-          <p:cNvCxnSpPr/>
-          <p:nvPr/>
-        </p:nvCxnSpPr>
-        <p:spPr>
-          <a:xfrm>
-            <a:off x="0" y="872719"/>
-            <a:ext cx="9144000" cy="0"/>
-          </a:xfrm>
-          <a:prstGeom prst="line">
-            <a:avLst/>
-          </a:prstGeom>
-          <a:ln w="17526">
-            <a:solidFill>
-              <a:srgbClr val="54AC5C"/>
-            </a:solidFill>
-          </a:ln>
-          <a:effectLst/>
-        </p:spPr>
-        <p:style>
-          <a:lnRef idx="2">
-            <a:schemeClr val="dk1"/>
-          </a:lnRef>
-          <a:fillRef idx="0">
-            <a:schemeClr val="dk1"/>
-          </a:fillRef>
-          <a:effectRef idx="1">
-            <a:schemeClr val="dk1"/>
-          </a:effectRef>
-          <a:fontRef idx="minor">
-            <a:schemeClr val="tx1"/>
-          </a:fontRef>
-        </p:style>
-      </p:cxnSp>
-      <p:sp>
-        <p:nvSpPr>
-          <p:cNvPr id="9" name="Rectangle 8">
-            <a:extLst>
-              <a:ext uri="{FF2B5EF4-FFF2-40B4-BE49-F238E27FC236}">
-                <a16:creationId xmlns:a16="http://schemas.microsoft.com/office/drawing/2014/main" id="{9963E5AE-FC0E-994F-8FB6-8FF07D5FCBB3}"/>
-              </a:ext>
-            </a:extLst>
-          </p:cNvPr>
-          <p:cNvSpPr/>
-          <p:nvPr/>
-        </p:nvSpPr>
-        <p:spPr>
-          <a:xfrm>
-            <a:off x="1020672" y="1082684"/>
-            <a:ext cx="2977803" cy="369332"/>
-          </a:xfrm>
-          <a:prstGeom prst="rect">
-            <a:avLst/>
-          </a:prstGeom>
-        </p:spPr>
-        <p:txBody>
-          <a:bodyPr wrap="none">
-            <a:spAutoFit/>
-          </a:bodyPr>
-          <a:lstStyle/>
-          <a:p>
-            <a:pPr marL="285750" indent="-285750">
-              <a:spcAft>
-                <a:spcPts val="600"/>
-              </a:spcAft>
-              <a:buFont typeface="Arial" panose="020B0604020202020204" pitchFamily="34" charset="0"/>
-              <a:buChar char="•"/>
-            </a:pPr>
-            <a:r>
-              <a:rPr lang="en-US" dirty="0"/>
-              <a:t>Method 2:     Decision Tree</a:t>
-            </a:r>
-          </a:p>
-        </p:txBody>
-      </p:sp>
-      <p:sp>
-        <p:nvSpPr>
-          <p:cNvPr id="11" name="Rectangle 10">
-            <a:extLst>
-              <a:ext uri="{FF2B5EF4-FFF2-40B4-BE49-F238E27FC236}">
-                <a16:creationId xmlns:a16="http://schemas.microsoft.com/office/drawing/2014/main" id="{F57B9DD2-1E24-E345-9053-A9DEC67A6125}"/>
-              </a:ext>
-            </a:extLst>
-          </p:cNvPr>
-          <p:cNvSpPr/>
-          <p:nvPr/>
-        </p:nvSpPr>
-        <p:spPr>
-          <a:xfrm>
-            <a:off x="1539093" y="2500527"/>
-            <a:ext cx="1887248" cy="369332"/>
-          </a:xfrm>
-          <a:prstGeom prst="rect">
-            <a:avLst/>
-          </a:prstGeom>
-        </p:spPr>
-        <p:txBody>
-          <a:bodyPr wrap="none">
-            <a:spAutoFit/>
-          </a:bodyPr>
-          <a:lstStyle/>
-          <a:p>
-            <a:r>
-              <a:rPr lang="en-US" dirty="0"/>
-              <a:t>Acc – Cutoff curve</a:t>
-            </a:r>
-          </a:p>
-        </p:txBody>
-      </p:sp>
-      <p:sp>
-        <p:nvSpPr>
-          <p:cNvPr id="12" name="Rectangle 11">
-            <a:extLst>
-              <a:ext uri="{FF2B5EF4-FFF2-40B4-BE49-F238E27FC236}">
-                <a16:creationId xmlns:a16="http://schemas.microsoft.com/office/drawing/2014/main" id="{C9B91779-E3E2-E14D-BD4E-109802849FE2}"/>
-              </a:ext>
-            </a:extLst>
-          </p:cNvPr>
-          <p:cNvSpPr/>
-          <p:nvPr/>
-        </p:nvSpPr>
-        <p:spPr>
-          <a:xfrm>
-            <a:off x="6004693" y="2500527"/>
-            <a:ext cx="1180964" cy="369332"/>
-          </a:xfrm>
-          <a:prstGeom prst="rect">
-            <a:avLst/>
-          </a:prstGeom>
-        </p:spPr>
-        <p:txBody>
-          <a:bodyPr wrap="none">
-            <a:spAutoFit/>
-          </a:bodyPr>
-          <a:lstStyle/>
-          <a:p>
-            <a:r>
-              <a:rPr lang="en-US" dirty="0"/>
-              <a:t>ROC Curve</a:t>
-            </a:r>
-          </a:p>
-        </p:txBody>
-      </p:sp>
-    </p:spTree>
-    <p:extLst>
-      <p:ext uri="{BB962C8B-B14F-4D97-AF65-F5344CB8AC3E}">
-        <p14:creationId xmlns:p14="http://schemas.microsoft.com/office/powerpoint/2010/main" val="2653269401"/>
-      </p:ext>
-    </p:extLst>
-  </p:cSld>
-  <p:clrMapOvr>
-    <a:masterClrMapping/>
-  </p:clrMapOvr>
-</p:sld>
-</file>
-
-<file path=ppt/slides/slide11.xml><?xml version="1.0" encoding="utf-8"?>
-<p:sld xmlns:a="http://schemas.openxmlformats.org/drawingml/2006/main" xmlns:r="http://schemas.openxmlformats.org/officeDocument/2006/relationships" xmlns:p="http://schemas.openxmlformats.org/presentationml/2006/main">
-  <p:cSld>
-    <p:spTree>
-      <p:nvGrpSpPr>
-        <p:cNvPr id="1" name=""/>
-        <p:cNvGrpSpPr/>
-        <p:nvPr/>
-      </p:nvGrpSpPr>
-      <p:grpSpPr>
-        <a:xfrm>
-          <a:off x="0" y="0"/>
-          <a:ext cx="0" cy="0"/>
-          <a:chOff x="0" y="0"/>
-          <a:chExt cx="0" cy="0"/>
-        </a:xfrm>
-      </p:grpSpPr>
-      <p:pic>
-        <p:nvPicPr>
-          <p:cNvPr id="5" name="Picture 4" descr="A close up of text on a white background&#10;&#10;Description automatically generated">
-            <a:extLst>
-              <a:ext uri="{FF2B5EF4-FFF2-40B4-BE49-F238E27FC236}">
-                <a16:creationId xmlns:a16="http://schemas.microsoft.com/office/drawing/2014/main" id="{9C395463-4B61-E04B-9916-52F6FCC42B0F}"/>
-              </a:ext>
-            </a:extLst>
-          </p:cNvPr>
-          <p:cNvPicPr>
-            <a:picLocks noChangeAspect="1"/>
-          </p:cNvPicPr>
-          <p:nvPr/>
-        </p:nvPicPr>
-        <p:blipFill>
-          <a:blip r:embed="rId2"/>
-          <a:stretch>
-            <a:fillRect/>
-          </a:stretch>
-        </p:blipFill>
-        <p:spPr>
-          <a:xfrm>
-            <a:off x="338790" y="1744847"/>
-            <a:ext cx="4037396" cy="2845579"/>
-          </a:xfrm>
-          <a:prstGeom prst="rect">
-            <a:avLst/>
-          </a:prstGeom>
-        </p:spPr>
-      </p:pic>
-      <p:pic>
-        <p:nvPicPr>
-          <p:cNvPr id="7" name="Picture 6" descr="A close up of text on a white background&#10;&#10;Description automatically generated">
-            <a:extLst>
-              <a:ext uri="{FF2B5EF4-FFF2-40B4-BE49-F238E27FC236}">
-                <a16:creationId xmlns:a16="http://schemas.microsoft.com/office/drawing/2014/main" id="{579C2BA4-457C-8C49-885E-E3B22D659AD4}"/>
-              </a:ext>
-            </a:extLst>
-          </p:cNvPr>
-          <p:cNvPicPr>
-            <a:picLocks noChangeAspect="1"/>
-          </p:cNvPicPr>
-          <p:nvPr/>
-        </p:nvPicPr>
-        <p:blipFill>
-          <a:blip r:embed="rId3"/>
-          <a:stretch>
-            <a:fillRect/>
-          </a:stretch>
-        </p:blipFill>
-        <p:spPr>
-          <a:xfrm>
-            <a:off x="4572000" y="1744847"/>
-            <a:ext cx="4139024" cy="2845579"/>
-          </a:xfrm>
-          <a:prstGeom prst="rect">
-            <a:avLst/>
-          </a:prstGeom>
-        </p:spPr>
-      </p:pic>
-      <p:sp>
-        <p:nvSpPr>
           <p:cNvPr id="10" name="Rectangle 9">
             <a:extLst>
               <a:ext uri="{FF2B5EF4-FFF2-40B4-BE49-F238E27FC236}">
@@ -4081,7 +3797,7 @@
         <p:spPr>
           <a:xfrm>
             <a:off x="420783" y="337307"/>
-            <a:ext cx="5013808" cy="523220"/>
+            <a:ext cx="8302722" cy="523220"/>
           </a:xfrm>
           <a:prstGeom prst="rect">
             <a:avLst/>
@@ -4104,7 +3820,7 @@
                   <a:srgbClr val="54AC5C"/>
                 </a:solidFill>
               </a:rPr>
-              <a:t>Recall Q1: Variants Classification</a:t>
+              <a:t>Recall Q2: Weight of Features -&gt; Random Forest for Q1</a:t>
             </a:r>
           </a:p>
         </p:txBody>
@@ -4275,14 +3991,14 @@
           <p:nvPr>
             <p:extLst>
               <p:ext uri="{D42A27DB-BD31-4B8C-83A1-F6EECF244321}">
-                <p14:modId xmlns:p14="http://schemas.microsoft.com/office/powerpoint/2010/main" val="319817179"/>
+                <p14:modId xmlns:p14="http://schemas.microsoft.com/office/powerpoint/2010/main" val="3347479413"/>
               </p:ext>
             </p:extLst>
           </p:nvPr>
         </p:nvGraphicFramePr>
         <p:xfrm>
-          <a:off x="667520" y="5408173"/>
-          <a:ext cx="7678458" cy="1112520"/>
+          <a:off x="1532046" y="5408173"/>
+          <a:ext cx="6128696" cy="1112520"/>
         </p:xfrm>
         <a:graphic>
           <a:graphicData uri="http://schemas.openxmlformats.org/drawingml/2006/table">
@@ -4291,35 +4007,28 @@
                 <a:tableStyleId>{5C22544A-7EE6-4342-B048-85BDC9FD1C3A}</a:tableStyleId>
               </a:tblPr>
               <a:tblGrid>
-                <a:gridCol w="2404295">
+                <a:gridCol w="1554463">
                   <a:extLst>
                     <a:ext uri="{9D8B030D-6E8A-4147-A177-3AD203B41FA5}">
                       <a16:colId xmlns:a16="http://schemas.microsoft.com/office/drawing/2014/main" val="736555137"/>
                     </a:ext>
                   </a:extLst>
                 </a:gridCol>
-                <a:gridCol w="1001421">
-                  <a:extLst>
-                    <a:ext uri="{9D8B030D-6E8A-4147-A177-3AD203B41FA5}">
-                      <a16:colId xmlns:a16="http://schemas.microsoft.com/office/drawing/2014/main" val="2437322138"/>
-                    </a:ext>
-                  </a:extLst>
-                </a:gridCol>
-                <a:gridCol w="1413164">
-                  <a:extLst>
-                    <a:ext uri="{9D8B030D-6E8A-4147-A177-3AD203B41FA5}">
-                      <a16:colId xmlns:a16="http://schemas.microsoft.com/office/drawing/2014/main" val="3175943778"/>
-                    </a:ext>
-                  </a:extLst>
-                </a:gridCol>
-                <a:gridCol w="1047404">
+                <a:gridCol w="1188482">
                   <a:extLst>
                     <a:ext uri="{9D8B030D-6E8A-4147-A177-3AD203B41FA5}">
                       <a16:colId xmlns:a16="http://schemas.microsoft.com/office/drawing/2014/main" val="1999416728"/>
                     </a:ext>
                   </a:extLst>
                 </a:gridCol>
-                <a:gridCol w="1812174">
+                <a:gridCol w="1581665">
+                  <a:extLst>
+                    <a:ext uri="{9D8B030D-6E8A-4147-A177-3AD203B41FA5}">
+                      <a16:colId xmlns:a16="http://schemas.microsoft.com/office/drawing/2014/main" val="1320416286"/>
+                    </a:ext>
+                  </a:extLst>
+                </a:gridCol>
+                <a:gridCol w="1804086">
                   <a:extLst>
                     <a:ext uri="{9D8B030D-6E8A-4147-A177-3AD203B41FA5}">
                       <a16:colId xmlns:a16="http://schemas.microsoft.com/office/drawing/2014/main" val="929325862"/>
@@ -4378,18 +4087,13 @@
                     <a:lstStyle/>
                     <a:p>
                       <a:r>
-                        <a:rPr lang="en-US" dirty="0" err="1">
+                        <a:rPr lang="en-US" dirty="0">
                           <a:solidFill>
                             <a:schemeClr val="tx1"/>
                           </a:solidFill>
                         </a:rPr>
-                        <a:t>MyDT</a:t>
+                        <a:t>Logistic</a:t>
                       </a:r>
-                      <a:endParaRPr lang="en-US" dirty="0">
-                        <a:solidFill>
-                          <a:schemeClr val="tx1"/>
-                        </a:solidFill>
-                      </a:endParaRPr>
                     </a:p>
                   </a:txBody>
                   <a:tcPr>
@@ -4439,64 +4143,13 @@
                             <a:schemeClr val="tx1"/>
                           </a:solidFill>
                         </a:rPr>
-                        <a:t>SklearnDT</a:t>
+                        <a:t>DecisionTree</a:t>
                       </a:r>
                       <a:endParaRPr lang="en-US" dirty="0">
                         <a:solidFill>
                           <a:schemeClr val="tx1"/>
                         </a:solidFill>
                       </a:endParaRPr>
-                    </a:p>
-                  </a:txBody>
-                  <a:tcPr>
-                    <a:lnL w="12700" cmpd="sng">
-                      <a:noFill/>
-                    </a:lnL>
-                    <a:lnR w="12700" cmpd="sng">
-                      <a:noFill/>
-                    </a:lnR>
-                    <a:lnT w="12700" cap="flat" cmpd="sng" algn="ctr">
-                      <a:solidFill>
-                        <a:schemeClr val="tx1"/>
-                      </a:solidFill>
-                      <a:prstDash val="solid"/>
-                      <a:round/>
-                      <a:headEnd type="none" w="med" len="med"/>
-                      <a:tailEnd type="none" w="med" len="med"/>
-                    </a:lnT>
-                    <a:lnB w="12700" cap="flat" cmpd="sng" algn="ctr">
-                      <a:solidFill>
-                        <a:schemeClr val="tx1"/>
-                      </a:solidFill>
-                      <a:prstDash val="solid"/>
-                      <a:round/>
-                      <a:headEnd type="none" w="med" len="med"/>
-                      <a:tailEnd type="none" w="med" len="med"/>
-                    </a:lnB>
-                    <a:lnTlToBr w="12700" cmpd="sng">
-                      <a:noFill/>
-                      <a:prstDash val="solid"/>
-                    </a:lnTlToBr>
-                    <a:lnBlToTr w="12700" cmpd="sng">
-                      <a:noFill/>
-                      <a:prstDash val="solid"/>
-                    </a:lnBlToTr>
-                    <a:noFill/>
-                  </a:tcPr>
-                </a:tc>
-                <a:tc>
-                  <a:txBody>
-                    <a:bodyPr/>
-                    <a:lstStyle/>
-                    <a:p>
-                      <a:r>
-                        <a:rPr lang="en-US" dirty="0">
-                          <a:solidFill>
-                            <a:schemeClr val="tx1"/>
-                          </a:solidFill>
-                        </a:rPr>
-                        <a:t>Logistic</a:t>
-                      </a:r>
                     </a:p>
                   </a:txBody>
                   <a:tcPr>
@@ -4646,7 +4299,7 @@
                     <a:p>
                       <a:r>
                         <a:rPr lang="en-US" dirty="0"/>
-                        <a:t>68%</a:t>
+                        <a:t>53.6%</a:t>
                       </a:r>
                     </a:p>
                   </a:txBody>
@@ -4687,7 +4340,7 @@
                     <a:p>
                       <a:r>
                         <a:rPr lang="en-US" dirty="0"/>
-                        <a:t>64%</a:t>
+                        <a:t>63.1%</a:t>
                       </a:r>
                     </a:p>
                   </a:txBody>
@@ -4728,48 +4381,7 @@
                     <a:p>
                       <a:r>
                         <a:rPr lang="en-US" dirty="0"/>
-                        <a:t>73.7%</a:t>
-                      </a:r>
-                    </a:p>
-                  </a:txBody>
-                  <a:tcPr>
-                    <a:lnL w="12700" cmpd="sng">
-                      <a:noFill/>
-                    </a:lnL>
-                    <a:lnR w="12700" cmpd="sng">
-                      <a:noFill/>
-                    </a:lnR>
-                    <a:lnT w="12700" cap="flat" cmpd="sng" algn="ctr">
-                      <a:solidFill>
-                        <a:schemeClr val="tx1"/>
-                      </a:solidFill>
-                      <a:prstDash val="solid"/>
-                      <a:round/>
-                      <a:headEnd type="none" w="med" len="med"/>
-                      <a:tailEnd type="none" w="med" len="med"/>
-                    </a:lnT>
-                    <a:lnB w="12700" cmpd="sng">
-                      <a:noFill/>
-                    </a:lnB>
-                    <a:lnTlToBr w="12700" cmpd="sng">
-                      <a:noFill/>
-                      <a:prstDash val="solid"/>
-                    </a:lnTlToBr>
-                    <a:lnBlToTr w="12700" cmpd="sng">
-                      <a:noFill/>
-                      <a:prstDash val="solid"/>
-                    </a:lnBlToTr>
-                    <a:noFill/>
-                  </a:tcPr>
-                </a:tc>
-                <a:tc>
-                  <a:txBody>
-                    <a:bodyPr/>
-                    <a:lstStyle/>
-                    <a:p>
-                      <a:r>
-                        <a:rPr lang="en-US" dirty="0"/>
-                        <a:t>74%</a:t>
+                        <a:t>68.6%</a:t>
                       </a:r>
                     </a:p>
                   </a:txBody>
@@ -4817,7 +4429,7 @@
                     <a:p>
                       <a:r>
                         <a:rPr lang="en-US" dirty="0"/>
-                        <a:t>Avg Training Time(s)</a:t>
+                        <a:t>AUC</a:t>
                       </a:r>
                     </a:p>
                   </a:txBody>
@@ -4858,7 +4470,7 @@
                     <a:p>
                       <a:r>
                         <a:rPr lang="en-US" dirty="0"/>
-                        <a:t>23.1</a:t>
+                        <a:t>0.544</a:t>
                       </a:r>
                     </a:p>
                   </a:txBody>
@@ -4899,7 +4511,7 @@
                     <a:p>
                       <a:r>
                         <a:rPr lang="en-US" dirty="0"/>
-                        <a:t>0.38</a:t>
+                        <a:t>0.669</a:t>
                       </a:r>
                     </a:p>
                   </a:txBody>
@@ -4940,48 +4552,7 @@
                     <a:p>
                       <a:r>
                         <a:rPr lang="en-US" dirty="0"/>
-                        <a:t>0.31</a:t>
-                      </a:r>
-                    </a:p>
-                  </a:txBody>
-                  <a:tcPr>
-                    <a:lnL w="12700" cmpd="sng">
-                      <a:noFill/>
-                    </a:lnL>
-                    <a:lnR w="12700" cmpd="sng">
-                      <a:noFill/>
-                    </a:lnR>
-                    <a:lnT w="12700" cmpd="sng">
-                      <a:noFill/>
-                    </a:lnT>
-                    <a:lnB w="12700" cap="flat" cmpd="sng" algn="ctr">
-                      <a:solidFill>
-                        <a:schemeClr val="tx1"/>
-                      </a:solidFill>
-                      <a:prstDash val="solid"/>
-                      <a:round/>
-                      <a:headEnd type="none" w="med" len="med"/>
-                      <a:tailEnd type="none" w="med" len="med"/>
-                    </a:lnB>
-                    <a:lnTlToBr w="12700" cmpd="sng">
-                      <a:noFill/>
-                      <a:prstDash val="solid"/>
-                    </a:lnTlToBr>
-                    <a:lnBlToTr w="12700" cmpd="sng">
-                      <a:noFill/>
-                      <a:prstDash val="solid"/>
-                    </a:lnBlToTr>
-                    <a:noFill/>
-                  </a:tcPr>
-                </a:tc>
-                <a:tc>
-                  <a:txBody>
-                    <a:bodyPr/>
-                    <a:lstStyle/>
-                    <a:p>
-                      <a:r>
-                        <a:rPr lang="en-US" dirty="0"/>
-                        <a:t>72.6s</a:t>
+                        <a:t>0.747</a:t>
                       </a:r>
                     </a:p>
                   </a:txBody>
@@ -5025,6 +4596,66 @@
           </a:graphicData>
         </a:graphic>
       </p:graphicFrame>
+      <p:pic>
+        <p:nvPicPr>
+          <p:cNvPr id="3" name="Picture 2" descr="A screenshot of a cell phone&#10;&#10;Description automatically generated">
+            <a:extLst>
+              <a:ext uri="{FF2B5EF4-FFF2-40B4-BE49-F238E27FC236}">
+                <a16:creationId xmlns:a16="http://schemas.microsoft.com/office/drawing/2014/main" id="{DF7BA540-B5A4-E543-85DC-207A9B13863B}"/>
+              </a:ext>
+            </a:extLst>
+          </p:cNvPr>
+          <p:cNvPicPr>
+            <a:picLocks noChangeAspect="1"/>
+          </p:cNvPicPr>
+          <p:nvPr/>
+        </p:nvPicPr>
+        <p:blipFill>
+          <a:blip r:embed="rId2"/>
+          <a:stretch>
+            <a:fillRect/>
+          </a:stretch>
+        </p:blipFill>
+        <p:spPr>
+          <a:xfrm>
+            <a:off x="688745" y="2093699"/>
+            <a:ext cx="3573849" cy="2457021"/>
+          </a:xfrm>
+          <a:prstGeom prst="rect">
+            <a:avLst/>
+          </a:prstGeom>
+        </p:spPr>
+      </p:pic>
+      <p:pic>
+        <p:nvPicPr>
+          <p:cNvPr id="6" name="Picture 5" descr="A screenshot of a cell phone&#10;&#10;Description automatically generated">
+            <a:extLst>
+              <a:ext uri="{FF2B5EF4-FFF2-40B4-BE49-F238E27FC236}">
+                <a16:creationId xmlns:a16="http://schemas.microsoft.com/office/drawing/2014/main" id="{80621031-9DE7-5440-82EE-080726B9DE7B}"/>
+              </a:ext>
+            </a:extLst>
+          </p:cNvPr>
+          <p:cNvPicPr>
+            <a:picLocks noChangeAspect="1"/>
+          </p:cNvPicPr>
+          <p:nvPr/>
+        </p:nvPicPr>
+        <p:blipFill>
+          <a:blip r:embed="rId3"/>
+          <a:stretch>
+            <a:fillRect/>
+          </a:stretch>
+        </p:blipFill>
+        <p:spPr>
+          <a:xfrm>
+            <a:off x="4772129" y="2093699"/>
+            <a:ext cx="3573849" cy="2457021"/>
+          </a:xfrm>
+          <a:prstGeom prst="rect">
+            <a:avLst/>
+          </a:prstGeom>
+        </p:spPr>
+      </p:pic>
     </p:spTree>
     <p:extLst>
       <p:ext uri="{BB962C8B-B14F-4D97-AF65-F5344CB8AC3E}">
@@ -5121,7 +4752,7 @@
 </p:sld>
 </file>
 
-<file path=ppt/slides/slide12.xml><?xml version="1.0" encoding="utf-8"?>
+<file path=ppt/slides/slide11.xml><?xml version="1.0" encoding="utf-8"?>
 <p:sld xmlns:a="http://schemas.openxmlformats.org/drawingml/2006/main" xmlns:r="http://schemas.openxmlformats.org/officeDocument/2006/relationships" xmlns:p="http://schemas.openxmlformats.org/presentationml/2006/main">
   <p:cSld>
     <p:spTree>
@@ -5153,7 +4784,7 @@
         <p:spPr>
           <a:xfrm>
             <a:off x="420783" y="337307"/>
-            <a:ext cx="5013808" cy="523220"/>
+            <a:ext cx="4051365" cy="523220"/>
           </a:xfrm>
           <a:prstGeom prst="rect">
             <a:avLst/>
@@ -5176,7 +4807,7 @@
                   <a:srgbClr val="54AC5C"/>
                 </a:solidFill>
               </a:rPr>
-              <a:t>Recall Q1: Variants Classification</a:t>
+              <a:t>Q1: Variants Classification</a:t>
             </a:r>
           </a:p>
         </p:txBody>
@@ -8064,6 +7695,235 @@
 </p:sld>
 </file>
 
+<file path=ppt/slides/slide12.xml><?xml version="1.0" encoding="utf-8"?>
+<p:sld xmlns:a="http://schemas.openxmlformats.org/drawingml/2006/main" xmlns:r="http://schemas.openxmlformats.org/officeDocument/2006/relationships" xmlns:p="http://schemas.openxmlformats.org/presentationml/2006/main">
+  <p:cSld>
+    <p:spTree>
+      <p:nvGrpSpPr>
+        <p:cNvPr id="1" name=""/>
+        <p:cNvGrpSpPr/>
+        <p:nvPr/>
+      </p:nvGrpSpPr>
+      <p:grpSpPr>
+        <a:xfrm>
+          <a:off x="0" y="0"/>
+          <a:ext cx="0" cy="0"/>
+          <a:chOff x="0" y="0"/>
+          <a:chExt cx="0" cy="0"/>
+        </a:xfrm>
+      </p:grpSpPr>
+      <p:sp>
+        <p:nvSpPr>
+          <p:cNvPr id="10" name="Rectangle 9">
+            <a:extLst>
+              <a:ext uri="{FF2B5EF4-FFF2-40B4-BE49-F238E27FC236}">
+                <a16:creationId xmlns:a16="http://schemas.microsoft.com/office/drawing/2014/main" id="{CBA0379D-906B-7146-A4A2-4D0380ACB59A}"/>
+              </a:ext>
+            </a:extLst>
+          </p:cNvPr>
+          <p:cNvSpPr/>
+          <p:nvPr/>
+        </p:nvSpPr>
+        <p:spPr>
+          <a:xfrm>
+            <a:off x="420783" y="337307"/>
+            <a:ext cx="4051365" cy="523220"/>
+          </a:xfrm>
+          <a:prstGeom prst="rect">
+            <a:avLst/>
+          </a:prstGeom>
+        </p:spPr>
+        <p:txBody>
+          <a:bodyPr wrap="none">
+            <a:spAutoFit/>
+          </a:bodyPr>
+          <a:lstStyle/>
+          <a:p>
+            <a:pPr>
+              <a:spcAft>
+                <a:spcPts val="600"/>
+              </a:spcAft>
+            </a:pPr>
+            <a:r>
+              <a:rPr lang="en-US" sz="2800" b="1" dirty="0">
+                <a:solidFill>
+                  <a:srgbClr val="54AC5C"/>
+                </a:solidFill>
+              </a:rPr>
+              <a:t>Q1: Variants Classification</a:t>
+            </a:r>
+          </a:p>
+        </p:txBody>
+      </p:sp>
+      <p:cxnSp>
+        <p:nvCxnSpPr>
+          <p:cNvPr id="11" name="Straight Connector 10">
+            <a:extLst>
+              <a:ext uri="{FF2B5EF4-FFF2-40B4-BE49-F238E27FC236}">
+                <a16:creationId xmlns:a16="http://schemas.microsoft.com/office/drawing/2014/main" id="{FD0AC502-FEB3-E841-B91A-152E4897646F}"/>
+              </a:ext>
+            </a:extLst>
+          </p:cNvPr>
+          <p:cNvCxnSpPr/>
+          <p:nvPr/>
+        </p:nvCxnSpPr>
+        <p:spPr>
+          <a:xfrm>
+            <a:off x="0" y="872719"/>
+            <a:ext cx="9144000" cy="0"/>
+          </a:xfrm>
+          <a:prstGeom prst="line">
+            <a:avLst/>
+          </a:prstGeom>
+          <a:ln w="17526">
+            <a:solidFill>
+              <a:srgbClr val="54AC5C"/>
+            </a:solidFill>
+          </a:ln>
+          <a:effectLst/>
+        </p:spPr>
+        <p:style>
+          <a:lnRef idx="2">
+            <a:schemeClr val="dk1"/>
+          </a:lnRef>
+          <a:fillRef idx="0">
+            <a:schemeClr val="dk1"/>
+          </a:fillRef>
+          <a:effectRef idx="1">
+            <a:schemeClr val="dk1"/>
+          </a:effectRef>
+          <a:fontRef idx="minor">
+            <a:schemeClr val="tx1"/>
+          </a:fontRef>
+        </p:style>
+      </p:cxnSp>
+      <p:sp>
+        <p:nvSpPr>
+          <p:cNvPr id="12" name="Rectangle 11">
+            <a:extLst>
+              <a:ext uri="{FF2B5EF4-FFF2-40B4-BE49-F238E27FC236}">
+                <a16:creationId xmlns:a16="http://schemas.microsoft.com/office/drawing/2014/main" id="{8CE75FF6-47A6-6140-8E90-F02C10371DCD}"/>
+              </a:ext>
+            </a:extLst>
+          </p:cNvPr>
+          <p:cNvSpPr/>
+          <p:nvPr/>
+        </p:nvSpPr>
+        <p:spPr>
+          <a:xfrm>
+            <a:off x="1020672" y="1082684"/>
+            <a:ext cx="2619050" cy="369332"/>
+          </a:xfrm>
+          <a:prstGeom prst="rect">
+            <a:avLst/>
+          </a:prstGeom>
+        </p:spPr>
+        <p:txBody>
+          <a:bodyPr wrap="none">
+            <a:spAutoFit/>
+          </a:bodyPr>
+          <a:lstStyle/>
+          <a:p>
+            <a:pPr marL="285750" indent="-285750">
+              <a:spcAft>
+                <a:spcPts val="600"/>
+              </a:spcAft>
+              <a:buFont typeface="Arial" panose="020B0604020202020204" pitchFamily="34" charset="0"/>
+              <a:buChar char="•"/>
+            </a:pPr>
+            <a:r>
+              <a:rPr lang="en-US" dirty="0"/>
+              <a:t>Method 4:     </a:t>
+            </a:r>
+            <a:r>
+              <a:rPr lang="en-US" dirty="0" err="1"/>
+              <a:t>Adaboost</a:t>
+            </a:r>
+            <a:endParaRPr lang="en-US" dirty="0"/>
+          </a:p>
+        </p:txBody>
+      </p:sp>
+      <p:sp>
+        <p:nvSpPr>
+          <p:cNvPr id="7" name="Rectangle 6">
+            <a:extLst>
+              <a:ext uri="{FF2B5EF4-FFF2-40B4-BE49-F238E27FC236}">
+                <a16:creationId xmlns:a16="http://schemas.microsoft.com/office/drawing/2014/main" id="{CF8CEA82-0056-F143-91EF-C289CAD6BBFE}"/>
+              </a:ext>
+            </a:extLst>
+          </p:cNvPr>
+          <p:cNvSpPr/>
+          <p:nvPr/>
+        </p:nvSpPr>
+        <p:spPr>
+          <a:xfrm>
+            <a:off x="1539093" y="2500527"/>
+            <a:ext cx="1887248" cy="369332"/>
+          </a:xfrm>
+          <a:prstGeom prst="rect">
+            <a:avLst/>
+          </a:prstGeom>
+        </p:spPr>
+        <p:txBody>
+          <a:bodyPr wrap="none">
+            <a:spAutoFit/>
+          </a:bodyPr>
+          <a:lstStyle/>
+          <a:p>
+            <a:r>
+              <a:rPr lang="en-US" dirty="0"/>
+              <a:t>Acc – Cutoff curve</a:t>
+            </a:r>
+          </a:p>
+        </p:txBody>
+      </p:sp>
+      <p:sp>
+        <p:nvSpPr>
+          <p:cNvPr id="13" name="Rectangle 12">
+            <a:extLst>
+              <a:ext uri="{FF2B5EF4-FFF2-40B4-BE49-F238E27FC236}">
+                <a16:creationId xmlns:a16="http://schemas.microsoft.com/office/drawing/2014/main" id="{6984DFEA-4F77-F94A-B697-852FEC92651A}"/>
+              </a:ext>
+            </a:extLst>
+          </p:cNvPr>
+          <p:cNvSpPr/>
+          <p:nvPr/>
+        </p:nvSpPr>
+        <p:spPr>
+          <a:xfrm>
+            <a:off x="6004693" y="2500527"/>
+            <a:ext cx="1180964" cy="369332"/>
+          </a:xfrm>
+          <a:prstGeom prst="rect">
+            <a:avLst/>
+          </a:prstGeom>
+        </p:spPr>
+        <p:txBody>
+          <a:bodyPr wrap="none">
+            <a:spAutoFit/>
+          </a:bodyPr>
+          <a:lstStyle/>
+          <a:p>
+            <a:r>
+              <a:rPr lang="en-US" dirty="0"/>
+              <a:t>ROC Curve</a:t>
+            </a:r>
+          </a:p>
+        </p:txBody>
+      </p:sp>
+    </p:spTree>
+    <p:extLst>
+      <p:ext uri="{BB962C8B-B14F-4D97-AF65-F5344CB8AC3E}">
+        <p14:creationId xmlns:p14="http://schemas.microsoft.com/office/powerpoint/2010/main" val="3943609060"/>
+      </p:ext>
+    </p:extLst>
+  </p:cSld>
+  <p:clrMapOvr>
+    <a:masterClrMapping/>
+  </p:clrMapOvr>
+</p:sld>
+</file>
+
 <file path=ppt/slides/slide13.xml><?xml version="1.0" encoding="utf-8"?>
 <p:sld xmlns:a="http://schemas.openxmlformats.org/drawingml/2006/main" xmlns:r="http://schemas.openxmlformats.org/officeDocument/2006/relationships" xmlns:p="http://schemas.openxmlformats.org/presentationml/2006/main">
   <p:cSld>
@@ -8096,7 +7956,7 @@
         <p:spPr>
           <a:xfrm>
             <a:off x="420783" y="337307"/>
-            <a:ext cx="5013808" cy="523220"/>
+            <a:ext cx="4051365" cy="523220"/>
           </a:xfrm>
           <a:prstGeom prst="rect">
             <a:avLst/>
@@ -8119,7 +7979,7 @@
                   <a:srgbClr val="54AC5C"/>
                 </a:solidFill>
               </a:rPr>
-              <a:t>Recall Q1: Variants Classification</a:t>
+              <a:t>Q1: Variants Classification</a:t>
             </a:r>
           </a:p>
         </p:txBody>
@@ -8227,7 +8087,7 @@
         <p:spPr>
           <a:xfrm>
             <a:off x="1539093" y="2500527"/>
-            <a:ext cx="1887248" cy="369332"/>
+            <a:ext cx="2391617" cy="369332"/>
           </a:xfrm>
           <a:prstGeom prst="rect">
             <a:avLst/>
@@ -8241,7 +8101,7 @@
           <a:p>
             <a:r>
               <a:rPr lang="en-US" dirty="0"/>
-              <a:t>Acc – Cutoff curve</a:t>
+              <a:t>Boosting of Training Set</a:t>
             </a:r>
           </a:p>
         </p:txBody>
@@ -8260,8 +8120,8 @@
         </p:nvSpPr>
         <p:spPr>
           <a:xfrm>
-            <a:off x="6004693" y="2500527"/>
-            <a:ext cx="1180964" cy="369332"/>
+            <a:off x="1539093" y="3988142"/>
+            <a:ext cx="1643591" cy="369332"/>
           </a:xfrm>
           <a:prstGeom prst="rect">
             <a:avLst/>
@@ -8275,15 +8135,50 @@
           <a:p>
             <a:r>
               <a:rPr lang="en-US" dirty="0"/>
-              <a:t>ROC Curve</a:t>
-            </a:r>
+              <a:t>Losing Diversity</a:t>
+            </a:r>
+          </a:p>
+        </p:txBody>
+      </p:sp>
+      <p:sp>
+        <p:nvSpPr>
+          <p:cNvPr id="8" name="Rectangle 7">
+            <a:extLst>
+              <a:ext uri="{FF2B5EF4-FFF2-40B4-BE49-F238E27FC236}">
+                <a16:creationId xmlns:a16="http://schemas.microsoft.com/office/drawing/2014/main" id="{A6DB88B8-C2EA-D946-89CC-E65A769A2A26}"/>
+              </a:ext>
+            </a:extLst>
+          </p:cNvPr>
+          <p:cNvSpPr/>
+          <p:nvPr/>
+        </p:nvSpPr>
+        <p:spPr>
+          <a:xfrm>
+            <a:off x="1539093" y="5291091"/>
+            <a:ext cx="1192249" cy="369332"/>
+          </a:xfrm>
+          <a:prstGeom prst="rect">
+            <a:avLst/>
+          </a:prstGeom>
+        </p:spPr>
+        <p:txBody>
+          <a:bodyPr wrap="none">
+            <a:spAutoFit/>
+          </a:bodyPr>
+          <a:lstStyle/>
+          <a:p>
+            <a:r>
+              <a:rPr lang="en-US"/>
+              <a:t>Overfitting</a:t>
+            </a:r>
+            <a:endParaRPr lang="en-US" dirty="0"/>
           </a:p>
         </p:txBody>
       </p:sp>
     </p:spTree>
     <p:extLst>
       <p:ext uri="{BB962C8B-B14F-4D97-AF65-F5344CB8AC3E}">
-        <p14:creationId xmlns:p14="http://schemas.microsoft.com/office/powerpoint/2010/main" val="3943609060"/>
+        <p14:creationId xmlns:p14="http://schemas.microsoft.com/office/powerpoint/2010/main" val="1270357409"/>
       </p:ext>
     </p:extLst>
   </p:cSld>
@@ -12536,11 +12431,7 @@
           <a:p>
             <a:r>
               <a:rPr lang="en-US" sz="2400" dirty="0"/>
-              <a:t>3.  </a:t>
-            </a:r>
-            <a:r>
-              <a:rPr lang="en-US" sz="2400"/>
-              <a:t>S</a:t>
+              <a:t>3.  Power of Ensemble Learning</a:t>
             </a:r>
             <a:endParaRPr lang="en-US" sz="2400" dirty="0">
               <a:solidFill>
@@ -12594,8 +12485,8 @@
         </p:nvSpPr>
         <p:spPr>
           <a:xfrm>
-            <a:off x="1473129" y="2385234"/>
-            <a:ext cx="3888061" cy="830997"/>
+            <a:off x="1136470" y="1569023"/>
+            <a:ext cx="4902957" cy="1015663"/>
           </a:xfrm>
           <a:prstGeom prst="rect">
             <a:avLst/>
@@ -12609,7 +12500,7 @@
           <a:lstStyle/>
           <a:p>
             <a:r>
-              <a:rPr lang="en-US" sz="4800" b="1" dirty="0">
+              <a:rPr lang="en-US" sz="6000" b="1" dirty="0">
                 <a:solidFill>
                   <a:schemeClr val="accent6"/>
                 </a:solidFill>
@@ -12668,6 +12559,84 @@
               <a:rPr lang="en-US" dirty="0"/>
               <a:t> Huang	</a:t>
             </a:r>
+          </a:p>
+        </p:txBody>
+      </p:sp>
+      <p:sp>
+        <p:nvSpPr>
+          <p:cNvPr id="5" name="TextBox 4">
+            <a:extLst>
+              <a:ext uri="{FF2B5EF4-FFF2-40B4-BE49-F238E27FC236}">
+                <a16:creationId xmlns:a16="http://schemas.microsoft.com/office/drawing/2014/main" id="{D4712489-B97B-D947-9B1F-CA31A797F6FC}"/>
+              </a:ext>
+            </a:extLst>
+          </p:cNvPr>
+          <p:cNvSpPr txBox="1"/>
+          <p:nvPr/>
+        </p:nvSpPr>
+        <p:spPr>
+          <a:xfrm>
+            <a:off x="2627325" y="3084893"/>
+            <a:ext cx="3889348" cy="584775"/>
+          </a:xfrm>
+          <a:prstGeom prst="rect">
+            <a:avLst/>
+          </a:prstGeom>
+          <a:noFill/>
+        </p:spPr>
+        <p:txBody>
+          <a:bodyPr wrap="square" rtlCol="0">
+            <a:spAutoFit/>
+          </a:bodyPr>
+          <a:lstStyle/>
+          <a:p>
+            <a:pPr algn="ctr"/>
+            <a:r>
+              <a:rPr lang="en-US" sz="3200" b="1" dirty="0">
+                <a:solidFill>
+                  <a:schemeClr val="accent6"/>
+                </a:solidFill>
+              </a:rPr>
+              <a:t>Open Source Later</a:t>
+            </a:r>
+          </a:p>
+        </p:txBody>
+      </p:sp>
+      <p:sp>
+        <p:nvSpPr>
+          <p:cNvPr id="2" name="Rectangle 1">
+            <a:extLst>
+              <a:ext uri="{FF2B5EF4-FFF2-40B4-BE49-F238E27FC236}">
+                <a16:creationId xmlns:a16="http://schemas.microsoft.com/office/drawing/2014/main" id="{53819850-EE4C-924F-B159-AF9DFB0BDCB3}"/>
+              </a:ext>
+            </a:extLst>
+          </p:cNvPr>
+          <p:cNvSpPr/>
+          <p:nvPr/>
+        </p:nvSpPr>
+        <p:spPr>
+          <a:xfrm>
+            <a:off x="2572638" y="3669668"/>
+            <a:ext cx="3998723" cy="369332"/>
+          </a:xfrm>
+          <a:prstGeom prst="rect">
+            <a:avLst/>
+          </a:prstGeom>
+        </p:spPr>
+        <p:txBody>
+          <a:bodyPr wrap="none">
+            <a:spAutoFit/>
+          </a:bodyPr>
+          <a:lstStyle/>
+          <a:p>
+            <a:pPr algn="ctr"/>
+            <a:r>
+              <a:rPr lang="en-US" dirty="0">
+                <a:hlinkClick r:id="rId2"/>
+              </a:rPr>
+              <a:t>github.com/frostace/BinaryClassification</a:t>
+            </a:r>
+            <a:endParaRPr lang="en-US" dirty="0"/>
           </a:p>
         </p:txBody>
       </p:sp>
@@ -20958,7 +20927,7 @@
           <p:cNvPr id="7" name="Rectangle 6">
             <a:extLst>
               <a:ext uri="{FF2B5EF4-FFF2-40B4-BE49-F238E27FC236}">
-                <a16:creationId xmlns:a16="http://schemas.microsoft.com/office/drawing/2014/main" id="{B41993BB-8C36-6144-AD56-798AB1049E69}"/>
+                <a16:creationId xmlns:a16="http://schemas.microsoft.com/office/drawing/2014/main" id="{AE314084-4AA0-A54B-AF91-603368B26EA0}"/>
               </a:ext>
             </a:extLst>
           </p:cNvPr>
@@ -20967,789 +20936,6 @@
         </p:nvSpPr>
         <p:spPr>
           <a:xfrm>
-            <a:off x="3111822" y="1608663"/>
-            <a:ext cx="2920351" cy="369332"/>
-          </a:xfrm>
-          <a:prstGeom prst="rect">
-            <a:avLst/>
-          </a:prstGeom>
-        </p:spPr>
-        <p:txBody>
-          <a:bodyPr wrap="none">
-            <a:spAutoFit/>
-          </a:bodyPr>
-          <a:lstStyle/>
-          <a:p>
-            <a:r>
-              <a:rPr lang="en-US" dirty="0"/>
-              <a:t>My Model V.S. </a:t>
-            </a:r>
-            <a:r>
-              <a:rPr lang="en-US" dirty="0" err="1"/>
-              <a:t>sklearn</a:t>
-            </a:r>
-            <a:r>
-              <a:rPr lang="en-US" dirty="0"/>
-              <a:t> Model</a:t>
-            </a:r>
-          </a:p>
-        </p:txBody>
-      </p:sp>
-      <p:pic>
-        <p:nvPicPr>
-          <p:cNvPr id="6" name="Picture 5" descr="A close up of a map&#10;&#10;Description automatically generated">
-            <a:extLst>
-              <a:ext uri="{FF2B5EF4-FFF2-40B4-BE49-F238E27FC236}">
-                <a16:creationId xmlns:a16="http://schemas.microsoft.com/office/drawing/2014/main" id="{36C7F359-DF73-1E48-AAFC-52879063EF72}"/>
-              </a:ext>
-            </a:extLst>
-          </p:cNvPr>
-          <p:cNvPicPr>
-            <a:picLocks noChangeAspect="1"/>
-          </p:cNvPicPr>
-          <p:nvPr/>
-        </p:nvPicPr>
-        <p:blipFill rotWithShape="1">
-          <a:blip r:embed="rId2"/>
-          <a:srcRect t="11876"/>
-          <a:stretch/>
-        </p:blipFill>
-        <p:spPr>
-          <a:xfrm>
-            <a:off x="400160" y="2141757"/>
-            <a:ext cx="4047697" cy="2452327"/>
-          </a:xfrm>
-          <a:prstGeom prst="rect">
-            <a:avLst/>
-          </a:prstGeom>
-        </p:spPr>
-      </p:pic>
-      <p:pic>
-        <p:nvPicPr>
-          <p:cNvPr id="11" name="Picture 10" descr="A close up of text on a white background&#10;&#10;Description automatically generated">
-            <a:extLst>
-              <a:ext uri="{FF2B5EF4-FFF2-40B4-BE49-F238E27FC236}">
-                <a16:creationId xmlns:a16="http://schemas.microsoft.com/office/drawing/2014/main" id="{C7E33420-EC32-B340-8C94-358A20AE890E}"/>
-              </a:ext>
-            </a:extLst>
-          </p:cNvPr>
-          <p:cNvPicPr>
-            <a:picLocks noChangeAspect="1"/>
-          </p:cNvPicPr>
-          <p:nvPr/>
-        </p:nvPicPr>
-        <p:blipFill rotWithShape="1">
-          <a:blip r:embed="rId3"/>
-          <a:srcRect t="11876"/>
-          <a:stretch/>
-        </p:blipFill>
-        <p:spPr>
-          <a:xfrm>
-            <a:off x="4751808" y="2141757"/>
-            <a:ext cx="4011557" cy="2452328"/>
-          </a:xfrm>
-          <a:prstGeom prst="rect">
-            <a:avLst/>
-          </a:prstGeom>
-        </p:spPr>
-      </p:pic>
-      <p:graphicFrame>
-        <p:nvGraphicFramePr>
-          <p:cNvPr id="13" name="Table 12">
-            <a:extLst>
-              <a:ext uri="{FF2B5EF4-FFF2-40B4-BE49-F238E27FC236}">
-                <a16:creationId xmlns:a16="http://schemas.microsoft.com/office/drawing/2014/main" id="{3DEDEEC0-6179-9348-B947-9C21C129EF3C}"/>
-              </a:ext>
-            </a:extLst>
-          </p:cNvPr>
-          <p:cNvGraphicFramePr>
-            <a:graphicFrameLocks noGrp="1"/>
-          </p:cNvGraphicFramePr>
-          <p:nvPr>
-            <p:extLst>
-              <p:ext uri="{D42A27DB-BD31-4B8C-83A1-F6EECF244321}">
-                <p14:modId xmlns:p14="http://schemas.microsoft.com/office/powerpoint/2010/main" val="1635060780"/>
-              </p:ext>
-            </p:extLst>
-          </p:nvPr>
-        </p:nvGraphicFramePr>
-        <p:xfrm>
-          <a:off x="1532046" y="5276711"/>
-          <a:ext cx="6079905" cy="1112520"/>
-        </p:xfrm>
-        <a:graphic>
-          <a:graphicData uri="http://schemas.openxmlformats.org/drawingml/2006/table">
-            <a:tbl>
-              <a:tblPr firstRow="1" bandRow="1">
-                <a:tableStyleId>{5C22544A-7EE6-4342-B048-85BDC9FD1C3A}</a:tableStyleId>
-              </a:tblPr>
-              <a:tblGrid>
-                <a:gridCol w="2100637">
-                  <a:extLst>
-                    <a:ext uri="{9D8B030D-6E8A-4147-A177-3AD203B41FA5}">
-                      <a16:colId xmlns:a16="http://schemas.microsoft.com/office/drawing/2014/main" val="736555137"/>
-                    </a:ext>
-                  </a:extLst>
-                </a:gridCol>
-                <a:gridCol w="1311155">
-                  <a:extLst>
-                    <a:ext uri="{9D8B030D-6E8A-4147-A177-3AD203B41FA5}">
-                      <a16:colId xmlns:a16="http://schemas.microsoft.com/office/drawing/2014/main" val="2437322138"/>
-                    </a:ext>
-                  </a:extLst>
-                </a:gridCol>
-                <a:gridCol w="1342104">
-                  <a:extLst>
-                    <a:ext uri="{9D8B030D-6E8A-4147-A177-3AD203B41FA5}">
-                      <a16:colId xmlns:a16="http://schemas.microsoft.com/office/drawing/2014/main" val="3175943778"/>
-                    </a:ext>
-                  </a:extLst>
-                </a:gridCol>
-                <a:gridCol w="1326009">
-                  <a:extLst>
-                    <a:ext uri="{9D8B030D-6E8A-4147-A177-3AD203B41FA5}">
-                      <a16:colId xmlns:a16="http://schemas.microsoft.com/office/drawing/2014/main" val="1999416728"/>
-                    </a:ext>
-                  </a:extLst>
-                </a:gridCol>
-              </a:tblGrid>
-              <a:tr h="370840">
-                <a:tc>
-                  <a:txBody>
-                    <a:bodyPr/>
-                    <a:lstStyle/>
-                    <a:p>
-                      <a:endParaRPr lang="en-US" dirty="0"/>
-                    </a:p>
-                  </a:txBody>
-                  <a:tcPr>
-                    <a:lnL w="12700" cmpd="sng">
-                      <a:noFill/>
-                    </a:lnL>
-                    <a:lnR w="12700" cmpd="sng">
-                      <a:noFill/>
-                    </a:lnR>
-                    <a:lnT w="12700" cap="flat" cmpd="sng" algn="ctr">
-                      <a:solidFill>
-                        <a:schemeClr val="tx1"/>
-                      </a:solidFill>
-                      <a:prstDash val="solid"/>
-                      <a:round/>
-                      <a:headEnd type="none" w="med" len="med"/>
-                      <a:tailEnd type="none" w="med" len="med"/>
-                    </a:lnT>
-                    <a:lnB w="12700" cap="flat" cmpd="sng" algn="ctr">
-                      <a:solidFill>
-                        <a:schemeClr val="tx1"/>
-                      </a:solidFill>
-                      <a:prstDash val="solid"/>
-                      <a:round/>
-                      <a:headEnd type="none" w="med" len="med"/>
-                      <a:tailEnd type="none" w="med" len="med"/>
-                    </a:lnB>
-                    <a:lnTlToBr w="12700" cmpd="sng">
-                      <a:noFill/>
-                      <a:prstDash val="solid"/>
-                    </a:lnTlToBr>
-                    <a:lnBlToTr w="12700" cmpd="sng">
-                      <a:noFill/>
-                      <a:prstDash val="solid"/>
-                    </a:lnBlToTr>
-                    <a:noFill/>
-                  </a:tcPr>
-                </a:tc>
-                <a:tc>
-                  <a:txBody>
-                    <a:bodyPr/>
-                    <a:lstStyle/>
-                    <a:p>
-                      <a:r>
-                        <a:rPr lang="en-US" dirty="0">
-                          <a:solidFill>
-                            <a:schemeClr val="tx1"/>
-                          </a:solidFill>
-                        </a:rPr>
-                        <a:t>My Model</a:t>
-                      </a:r>
-                    </a:p>
-                  </a:txBody>
-                  <a:tcPr>
-                    <a:lnL w="12700" cmpd="sng">
-                      <a:noFill/>
-                    </a:lnL>
-                    <a:lnR w="12700" cmpd="sng">
-                      <a:noFill/>
-                    </a:lnR>
-                    <a:lnT w="12700" cap="flat" cmpd="sng" algn="ctr">
-                      <a:solidFill>
-                        <a:schemeClr val="tx1"/>
-                      </a:solidFill>
-                      <a:prstDash val="solid"/>
-                      <a:round/>
-                      <a:headEnd type="none" w="med" len="med"/>
-                      <a:tailEnd type="none" w="med" len="med"/>
-                    </a:lnT>
-                    <a:lnB w="12700" cap="flat" cmpd="sng" algn="ctr">
-                      <a:solidFill>
-                        <a:schemeClr val="tx1"/>
-                      </a:solidFill>
-                      <a:prstDash val="solid"/>
-                      <a:round/>
-                      <a:headEnd type="none" w="med" len="med"/>
-                      <a:tailEnd type="none" w="med" len="med"/>
-                    </a:lnB>
-                    <a:lnTlToBr w="12700" cmpd="sng">
-                      <a:noFill/>
-                      <a:prstDash val="solid"/>
-                    </a:lnTlToBr>
-                    <a:lnBlToTr w="12700" cmpd="sng">
-                      <a:noFill/>
-                      <a:prstDash val="solid"/>
-                    </a:lnBlToTr>
-                    <a:noFill/>
-                  </a:tcPr>
-                </a:tc>
-                <a:tc>
-                  <a:txBody>
-                    <a:bodyPr/>
-                    <a:lstStyle/>
-                    <a:p>
-                      <a:r>
-                        <a:rPr lang="en-US" dirty="0" err="1">
-                          <a:solidFill>
-                            <a:schemeClr val="tx1"/>
-                          </a:solidFill>
-                        </a:rPr>
-                        <a:t>Sklearn</a:t>
-                      </a:r>
-                      <a:endParaRPr lang="en-US" dirty="0">
-                        <a:solidFill>
-                          <a:schemeClr val="tx1"/>
-                        </a:solidFill>
-                      </a:endParaRPr>
-                    </a:p>
-                  </a:txBody>
-                  <a:tcPr>
-                    <a:lnL w="12700" cmpd="sng">
-                      <a:noFill/>
-                    </a:lnL>
-                    <a:lnR w="12700" cmpd="sng">
-                      <a:noFill/>
-                    </a:lnR>
-                    <a:lnT w="12700" cap="flat" cmpd="sng" algn="ctr">
-                      <a:solidFill>
-                        <a:schemeClr val="tx1"/>
-                      </a:solidFill>
-                      <a:prstDash val="solid"/>
-                      <a:round/>
-                      <a:headEnd type="none" w="med" len="med"/>
-                      <a:tailEnd type="none" w="med" len="med"/>
-                    </a:lnT>
-                    <a:lnB w="12700" cap="flat" cmpd="sng" algn="ctr">
-                      <a:solidFill>
-                        <a:schemeClr val="tx1"/>
-                      </a:solidFill>
-                      <a:prstDash val="solid"/>
-                      <a:round/>
-                      <a:headEnd type="none" w="med" len="med"/>
-                      <a:tailEnd type="none" w="med" len="med"/>
-                    </a:lnB>
-                    <a:lnTlToBr w="12700" cmpd="sng">
-                      <a:noFill/>
-                      <a:prstDash val="solid"/>
-                    </a:lnTlToBr>
-                    <a:lnBlToTr w="12700" cmpd="sng">
-                      <a:noFill/>
-                      <a:prstDash val="solid"/>
-                    </a:lnBlToTr>
-                    <a:noFill/>
-                  </a:tcPr>
-                </a:tc>
-                <a:tc>
-                  <a:txBody>
-                    <a:bodyPr/>
-                    <a:lstStyle/>
-                    <a:p>
-                      <a:r>
-                        <a:rPr lang="en-US" dirty="0">
-                          <a:solidFill>
-                            <a:schemeClr val="tx1"/>
-                          </a:solidFill>
-                        </a:rPr>
-                        <a:t>Logistic</a:t>
-                      </a:r>
-                    </a:p>
-                  </a:txBody>
-                  <a:tcPr>
-                    <a:lnL w="12700" cmpd="sng">
-                      <a:noFill/>
-                    </a:lnL>
-                    <a:lnR w="12700" cmpd="sng">
-                      <a:noFill/>
-                    </a:lnR>
-                    <a:lnT w="12700" cap="flat" cmpd="sng" algn="ctr">
-                      <a:solidFill>
-                        <a:schemeClr val="tx1"/>
-                      </a:solidFill>
-                      <a:prstDash val="solid"/>
-                      <a:round/>
-                      <a:headEnd type="none" w="med" len="med"/>
-                      <a:tailEnd type="none" w="med" len="med"/>
-                    </a:lnT>
-                    <a:lnB w="12700" cap="flat" cmpd="sng" algn="ctr">
-                      <a:solidFill>
-                        <a:schemeClr val="tx1"/>
-                      </a:solidFill>
-                      <a:prstDash val="solid"/>
-                      <a:round/>
-                      <a:headEnd type="none" w="med" len="med"/>
-                      <a:tailEnd type="none" w="med" len="med"/>
-                    </a:lnB>
-                    <a:lnTlToBr w="12700" cmpd="sng">
-                      <a:noFill/>
-                      <a:prstDash val="solid"/>
-                    </a:lnTlToBr>
-                    <a:lnBlToTr w="12700" cmpd="sng">
-                      <a:noFill/>
-                      <a:prstDash val="solid"/>
-                    </a:lnBlToTr>
-                    <a:noFill/>
-                  </a:tcPr>
-                </a:tc>
-                <a:extLst>
-                  <a:ext uri="{0D108BD9-81ED-4DB2-BD59-A6C34878D82A}">
-                    <a16:rowId xmlns:a16="http://schemas.microsoft.com/office/drawing/2014/main" val="688916677"/>
-                  </a:ext>
-                </a:extLst>
-              </a:tr>
-              <a:tr h="370840">
-                <a:tc>
-                  <a:txBody>
-                    <a:bodyPr/>
-                    <a:lstStyle/>
-                    <a:p>
-                      <a:r>
-                        <a:rPr lang="en-US" dirty="0"/>
-                        <a:t>Avg ACC(%)</a:t>
-                      </a:r>
-                    </a:p>
-                  </a:txBody>
-                  <a:tcPr>
-                    <a:lnL w="12700" cmpd="sng">
-                      <a:noFill/>
-                    </a:lnL>
-                    <a:lnR w="12700" cmpd="sng">
-                      <a:noFill/>
-                    </a:lnR>
-                    <a:lnT w="12700" cap="flat" cmpd="sng" algn="ctr">
-                      <a:solidFill>
-                        <a:schemeClr val="tx1"/>
-                      </a:solidFill>
-                      <a:prstDash val="solid"/>
-                      <a:round/>
-                      <a:headEnd type="none" w="med" len="med"/>
-                      <a:tailEnd type="none" w="med" len="med"/>
-                    </a:lnT>
-                    <a:lnB w="12700" cmpd="sng">
-                      <a:noFill/>
-                    </a:lnB>
-                    <a:lnTlToBr w="12700" cmpd="sng">
-                      <a:noFill/>
-                      <a:prstDash val="solid"/>
-                    </a:lnTlToBr>
-                    <a:lnBlToTr w="12700" cmpd="sng">
-                      <a:noFill/>
-                      <a:prstDash val="solid"/>
-                    </a:lnBlToTr>
-                    <a:noFill/>
-                  </a:tcPr>
-                </a:tc>
-                <a:tc>
-                  <a:txBody>
-                    <a:bodyPr/>
-                    <a:lstStyle/>
-                    <a:p>
-                      <a:r>
-                        <a:rPr lang="en-US" dirty="0"/>
-                        <a:t>68%</a:t>
-                      </a:r>
-                    </a:p>
-                  </a:txBody>
-                  <a:tcPr>
-                    <a:lnL w="12700" cmpd="sng">
-                      <a:noFill/>
-                    </a:lnL>
-                    <a:lnR w="12700" cmpd="sng">
-                      <a:noFill/>
-                    </a:lnR>
-                    <a:lnT w="12700" cap="flat" cmpd="sng" algn="ctr">
-                      <a:solidFill>
-                        <a:schemeClr val="tx1"/>
-                      </a:solidFill>
-                      <a:prstDash val="solid"/>
-                      <a:round/>
-                      <a:headEnd type="none" w="med" len="med"/>
-                      <a:tailEnd type="none" w="med" len="med"/>
-                    </a:lnT>
-                    <a:lnB w="12700" cmpd="sng">
-                      <a:noFill/>
-                    </a:lnB>
-                    <a:lnTlToBr w="12700" cmpd="sng">
-                      <a:noFill/>
-                      <a:prstDash val="solid"/>
-                    </a:lnTlToBr>
-                    <a:lnBlToTr w="12700" cmpd="sng">
-                      <a:noFill/>
-                      <a:prstDash val="solid"/>
-                    </a:lnBlToTr>
-                    <a:noFill/>
-                  </a:tcPr>
-                </a:tc>
-                <a:tc>
-                  <a:txBody>
-                    <a:bodyPr/>
-                    <a:lstStyle/>
-                    <a:p>
-                      <a:r>
-                        <a:rPr lang="en-US" dirty="0"/>
-                        <a:t>64%</a:t>
-                      </a:r>
-                    </a:p>
-                  </a:txBody>
-                  <a:tcPr>
-                    <a:lnL w="12700" cmpd="sng">
-                      <a:noFill/>
-                    </a:lnL>
-                    <a:lnR w="12700" cmpd="sng">
-                      <a:noFill/>
-                    </a:lnR>
-                    <a:lnT w="12700" cap="flat" cmpd="sng" algn="ctr">
-                      <a:solidFill>
-                        <a:schemeClr val="tx1"/>
-                      </a:solidFill>
-                      <a:prstDash val="solid"/>
-                      <a:round/>
-                      <a:headEnd type="none" w="med" len="med"/>
-                      <a:tailEnd type="none" w="med" len="med"/>
-                    </a:lnT>
-                    <a:lnB w="12700" cmpd="sng">
-                      <a:noFill/>
-                    </a:lnB>
-                    <a:lnTlToBr w="12700" cmpd="sng">
-                      <a:noFill/>
-                      <a:prstDash val="solid"/>
-                    </a:lnTlToBr>
-                    <a:lnBlToTr w="12700" cmpd="sng">
-                      <a:noFill/>
-                      <a:prstDash val="solid"/>
-                    </a:lnBlToTr>
-                    <a:noFill/>
-                  </a:tcPr>
-                </a:tc>
-                <a:tc>
-                  <a:txBody>
-                    <a:bodyPr/>
-                    <a:lstStyle/>
-                    <a:p>
-                      <a:r>
-                        <a:rPr lang="en-US" dirty="0"/>
-                        <a:t>73.7%</a:t>
-                      </a:r>
-                    </a:p>
-                  </a:txBody>
-                  <a:tcPr>
-                    <a:lnL w="12700" cmpd="sng">
-                      <a:noFill/>
-                    </a:lnL>
-                    <a:lnR w="12700" cmpd="sng">
-                      <a:noFill/>
-                    </a:lnR>
-                    <a:lnT w="12700" cap="flat" cmpd="sng" algn="ctr">
-                      <a:solidFill>
-                        <a:schemeClr val="tx1"/>
-                      </a:solidFill>
-                      <a:prstDash val="solid"/>
-                      <a:round/>
-                      <a:headEnd type="none" w="med" len="med"/>
-                      <a:tailEnd type="none" w="med" len="med"/>
-                    </a:lnT>
-                    <a:lnB w="12700" cmpd="sng">
-                      <a:noFill/>
-                    </a:lnB>
-                    <a:lnTlToBr w="12700" cmpd="sng">
-                      <a:noFill/>
-                      <a:prstDash val="solid"/>
-                    </a:lnTlToBr>
-                    <a:lnBlToTr w="12700" cmpd="sng">
-                      <a:noFill/>
-                      <a:prstDash val="solid"/>
-                    </a:lnBlToTr>
-                    <a:noFill/>
-                  </a:tcPr>
-                </a:tc>
-                <a:extLst>
-                  <a:ext uri="{0D108BD9-81ED-4DB2-BD59-A6C34878D82A}">
-                    <a16:rowId xmlns:a16="http://schemas.microsoft.com/office/drawing/2014/main" val="106053900"/>
-                  </a:ext>
-                </a:extLst>
-              </a:tr>
-              <a:tr h="370840">
-                <a:tc>
-                  <a:txBody>
-                    <a:bodyPr/>
-                    <a:lstStyle/>
-                    <a:p>
-                      <a:r>
-                        <a:rPr lang="en-US" dirty="0"/>
-                        <a:t>Avg Training Time(s)</a:t>
-                      </a:r>
-                    </a:p>
-                  </a:txBody>
-                  <a:tcPr>
-                    <a:lnL w="12700" cmpd="sng">
-                      <a:noFill/>
-                    </a:lnL>
-                    <a:lnR w="12700" cmpd="sng">
-                      <a:noFill/>
-                    </a:lnR>
-                    <a:lnT w="12700" cmpd="sng">
-                      <a:noFill/>
-                    </a:lnT>
-                    <a:lnB w="12700" cap="flat" cmpd="sng" algn="ctr">
-                      <a:solidFill>
-                        <a:schemeClr val="tx1"/>
-                      </a:solidFill>
-                      <a:prstDash val="solid"/>
-                      <a:round/>
-                      <a:headEnd type="none" w="med" len="med"/>
-                      <a:tailEnd type="none" w="med" len="med"/>
-                    </a:lnB>
-                    <a:lnTlToBr w="12700" cmpd="sng">
-                      <a:noFill/>
-                      <a:prstDash val="solid"/>
-                    </a:lnTlToBr>
-                    <a:lnBlToTr w="12700" cmpd="sng">
-                      <a:noFill/>
-                      <a:prstDash val="solid"/>
-                    </a:lnBlToTr>
-                    <a:noFill/>
-                  </a:tcPr>
-                </a:tc>
-                <a:tc>
-                  <a:txBody>
-                    <a:bodyPr/>
-                    <a:lstStyle/>
-                    <a:p>
-                      <a:r>
-                        <a:rPr lang="en-US" dirty="0"/>
-                        <a:t>23.1</a:t>
-                      </a:r>
-                    </a:p>
-                  </a:txBody>
-                  <a:tcPr>
-                    <a:lnL w="12700" cmpd="sng">
-                      <a:noFill/>
-                    </a:lnL>
-                    <a:lnR w="12700" cmpd="sng">
-                      <a:noFill/>
-                    </a:lnR>
-                    <a:lnT w="12700" cmpd="sng">
-                      <a:noFill/>
-                    </a:lnT>
-                    <a:lnB w="12700" cap="flat" cmpd="sng" algn="ctr">
-                      <a:solidFill>
-                        <a:schemeClr val="tx1"/>
-                      </a:solidFill>
-                      <a:prstDash val="solid"/>
-                      <a:round/>
-                      <a:headEnd type="none" w="med" len="med"/>
-                      <a:tailEnd type="none" w="med" len="med"/>
-                    </a:lnB>
-                    <a:lnTlToBr w="12700" cmpd="sng">
-                      <a:noFill/>
-                      <a:prstDash val="solid"/>
-                    </a:lnTlToBr>
-                    <a:lnBlToTr w="12700" cmpd="sng">
-                      <a:noFill/>
-                      <a:prstDash val="solid"/>
-                    </a:lnBlToTr>
-                    <a:noFill/>
-                  </a:tcPr>
-                </a:tc>
-                <a:tc>
-                  <a:txBody>
-                    <a:bodyPr/>
-                    <a:lstStyle/>
-                    <a:p>
-                      <a:r>
-                        <a:rPr lang="en-US" dirty="0"/>
-                        <a:t>0.38</a:t>
-                      </a:r>
-                    </a:p>
-                  </a:txBody>
-                  <a:tcPr>
-                    <a:lnL w="12700" cmpd="sng">
-                      <a:noFill/>
-                    </a:lnL>
-                    <a:lnR w="12700" cmpd="sng">
-                      <a:noFill/>
-                    </a:lnR>
-                    <a:lnT w="12700" cmpd="sng">
-                      <a:noFill/>
-                    </a:lnT>
-                    <a:lnB w="12700" cap="flat" cmpd="sng" algn="ctr">
-                      <a:solidFill>
-                        <a:schemeClr val="tx1"/>
-                      </a:solidFill>
-                      <a:prstDash val="solid"/>
-                      <a:round/>
-                      <a:headEnd type="none" w="med" len="med"/>
-                      <a:tailEnd type="none" w="med" len="med"/>
-                    </a:lnB>
-                    <a:lnTlToBr w="12700" cmpd="sng">
-                      <a:noFill/>
-                      <a:prstDash val="solid"/>
-                    </a:lnTlToBr>
-                    <a:lnBlToTr w="12700" cmpd="sng">
-                      <a:noFill/>
-                      <a:prstDash val="solid"/>
-                    </a:lnBlToTr>
-                    <a:noFill/>
-                  </a:tcPr>
-                </a:tc>
-                <a:tc>
-                  <a:txBody>
-                    <a:bodyPr/>
-                    <a:lstStyle/>
-                    <a:p>
-                      <a:r>
-                        <a:rPr lang="en-US" dirty="0"/>
-                        <a:t>0.31</a:t>
-                      </a:r>
-                    </a:p>
-                  </a:txBody>
-                  <a:tcPr>
-                    <a:lnL w="12700" cmpd="sng">
-                      <a:noFill/>
-                    </a:lnL>
-                    <a:lnR w="12700" cmpd="sng">
-                      <a:noFill/>
-                    </a:lnR>
-                    <a:lnT w="12700" cmpd="sng">
-                      <a:noFill/>
-                    </a:lnT>
-                    <a:lnB w="12700" cap="flat" cmpd="sng" algn="ctr">
-                      <a:solidFill>
-                        <a:schemeClr val="tx1"/>
-                      </a:solidFill>
-                      <a:prstDash val="solid"/>
-                      <a:round/>
-                      <a:headEnd type="none" w="med" len="med"/>
-                      <a:tailEnd type="none" w="med" len="med"/>
-                    </a:lnB>
-                    <a:lnTlToBr w="12700" cmpd="sng">
-                      <a:noFill/>
-                      <a:prstDash val="solid"/>
-                    </a:lnTlToBr>
-                    <a:lnBlToTr w="12700" cmpd="sng">
-                      <a:noFill/>
-                      <a:prstDash val="solid"/>
-                    </a:lnBlToTr>
-                    <a:noFill/>
-                  </a:tcPr>
-                </a:tc>
-                <a:extLst>
-                  <a:ext uri="{0D108BD9-81ED-4DB2-BD59-A6C34878D82A}">
-                    <a16:rowId xmlns:a16="http://schemas.microsoft.com/office/drawing/2014/main" val="4130038502"/>
-                  </a:ext>
-                </a:extLst>
-              </a:tr>
-            </a:tbl>
-          </a:graphicData>
-        </a:graphic>
-      </p:graphicFrame>
-      <p:sp>
-        <p:nvSpPr>
-          <p:cNvPr id="14" name="Rectangle 13">
-            <a:extLst>
-              <a:ext uri="{FF2B5EF4-FFF2-40B4-BE49-F238E27FC236}">
-                <a16:creationId xmlns:a16="http://schemas.microsoft.com/office/drawing/2014/main" id="{9B756878-0B5A-5342-962C-090C1C22904D}"/>
-              </a:ext>
-            </a:extLst>
-          </p:cNvPr>
-          <p:cNvSpPr/>
-          <p:nvPr/>
-        </p:nvSpPr>
-        <p:spPr>
-          <a:xfrm>
-            <a:off x="1795438" y="4675744"/>
-            <a:ext cx="1257139" cy="369332"/>
-          </a:xfrm>
-          <a:prstGeom prst="rect">
-            <a:avLst/>
-          </a:prstGeom>
-        </p:spPr>
-        <p:txBody>
-          <a:bodyPr wrap="none">
-            <a:spAutoFit/>
-          </a:bodyPr>
-          <a:lstStyle/>
-          <a:p>
-            <a:r>
-              <a:rPr lang="en-US" dirty="0"/>
-              <a:t>a) Accuracy</a:t>
-            </a:r>
-          </a:p>
-        </p:txBody>
-      </p:sp>
-      <p:sp>
-        <p:nvSpPr>
-          <p:cNvPr id="15" name="Rectangle 14">
-            <a:extLst>
-              <a:ext uri="{FF2B5EF4-FFF2-40B4-BE49-F238E27FC236}">
-                <a16:creationId xmlns:a16="http://schemas.microsoft.com/office/drawing/2014/main" id="{382DD910-BA0C-2447-BA4D-65501EDB4F6A}"/>
-              </a:ext>
-            </a:extLst>
-          </p:cNvPr>
-          <p:cNvSpPr/>
-          <p:nvPr/>
-        </p:nvSpPr>
-        <p:spPr>
-          <a:xfrm>
-            <a:off x="6310187" y="4675744"/>
-            <a:ext cx="894797" cy="369332"/>
-          </a:xfrm>
-          <a:prstGeom prst="rect">
-            <a:avLst/>
-          </a:prstGeom>
-        </p:spPr>
-        <p:txBody>
-          <a:bodyPr wrap="none">
-            <a:spAutoFit/>
-          </a:bodyPr>
-          <a:lstStyle/>
-          <a:p>
-            <a:r>
-              <a:rPr lang="en-US" dirty="0"/>
-              <a:t>b) Time</a:t>
-            </a:r>
-          </a:p>
-        </p:txBody>
-      </p:sp>
-      <p:sp>
-        <p:nvSpPr>
-          <p:cNvPr id="10" name="Rectangle 9">
-            <a:extLst>
-              <a:ext uri="{FF2B5EF4-FFF2-40B4-BE49-F238E27FC236}">
-                <a16:creationId xmlns:a16="http://schemas.microsoft.com/office/drawing/2014/main" id="{B30E5445-AABE-FB47-AC5E-629B8C2B1021}"/>
-              </a:ext>
-            </a:extLst>
-          </p:cNvPr>
-          <p:cNvSpPr/>
-          <p:nvPr/>
-        </p:nvSpPr>
-        <p:spPr>
-          <a:xfrm>
             <a:off x="420783" y="337307"/>
             <a:ext cx="4051365" cy="523220"/>
           </a:xfrm>
@@ -21781,10 +20967,10 @@
       </p:sp>
       <p:cxnSp>
         <p:nvCxnSpPr>
-          <p:cNvPr id="12" name="Straight Connector 11">
+          <p:cNvPr id="8" name="Straight Connector 7">
             <a:extLst>
               <a:ext uri="{FF2B5EF4-FFF2-40B4-BE49-F238E27FC236}">
-                <a16:creationId xmlns:a16="http://schemas.microsoft.com/office/drawing/2014/main" id="{7D2D14BC-1F74-7948-AF38-14057FFB8DBF}"/>
+                <a16:creationId xmlns:a16="http://schemas.microsoft.com/office/drawing/2014/main" id="{1DFF1BA9-A783-624F-8B47-59877EDCC3C5}"/>
               </a:ext>
             </a:extLst>
           </p:cNvPr>
@@ -21823,10 +21009,10 @@
       </p:cxnSp>
       <p:sp>
         <p:nvSpPr>
-          <p:cNvPr id="16" name="Rectangle 15">
+          <p:cNvPr id="9" name="Rectangle 8">
             <a:extLst>
               <a:ext uri="{FF2B5EF4-FFF2-40B4-BE49-F238E27FC236}">
-                <a16:creationId xmlns:a16="http://schemas.microsoft.com/office/drawing/2014/main" id="{3FE0452C-DE88-E04A-AA64-534CBE382386}"/>
+                <a16:creationId xmlns:a16="http://schemas.microsoft.com/office/drawing/2014/main" id="{9963E5AE-FC0E-994F-8FB6-8FF07D5FCBB3}"/>
               </a:ext>
             </a:extLst>
           </p:cNvPr>
@@ -21862,297 +21048,144 @@
           </a:p>
         </p:txBody>
       </p:sp>
+      <p:sp>
+        <p:nvSpPr>
+          <p:cNvPr id="11" name="Rectangle 10">
+            <a:extLst>
+              <a:ext uri="{FF2B5EF4-FFF2-40B4-BE49-F238E27FC236}">
+                <a16:creationId xmlns:a16="http://schemas.microsoft.com/office/drawing/2014/main" id="{F57B9DD2-1E24-E345-9053-A9DEC67A6125}"/>
+              </a:ext>
+            </a:extLst>
+          </p:cNvPr>
+          <p:cNvSpPr/>
+          <p:nvPr/>
+        </p:nvSpPr>
+        <p:spPr>
+          <a:xfrm>
+            <a:off x="1565949" y="4738719"/>
+            <a:ext cx="1887248" cy="369332"/>
+          </a:xfrm>
+          <a:prstGeom prst="rect">
+            <a:avLst/>
+          </a:prstGeom>
+        </p:spPr>
+        <p:txBody>
+          <a:bodyPr wrap="none">
+            <a:spAutoFit/>
+          </a:bodyPr>
+          <a:lstStyle/>
+          <a:p>
+            <a:r>
+              <a:rPr lang="en-US" dirty="0"/>
+              <a:t>Acc – Cutoff curve</a:t>
+            </a:r>
+          </a:p>
+        </p:txBody>
+      </p:sp>
+      <p:sp>
+        <p:nvSpPr>
+          <p:cNvPr id="12" name="Rectangle 11">
+            <a:extLst>
+              <a:ext uri="{FF2B5EF4-FFF2-40B4-BE49-F238E27FC236}">
+                <a16:creationId xmlns:a16="http://schemas.microsoft.com/office/drawing/2014/main" id="{C9B91779-E3E2-E14D-BD4E-109802849FE2}"/>
+              </a:ext>
+            </a:extLst>
+          </p:cNvPr>
+          <p:cNvSpPr/>
+          <p:nvPr/>
+        </p:nvSpPr>
+        <p:spPr>
+          <a:xfrm>
+            <a:off x="5990772" y="4738719"/>
+            <a:ext cx="1180964" cy="369332"/>
+          </a:xfrm>
+          <a:prstGeom prst="rect">
+            <a:avLst/>
+          </a:prstGeom>
+        </p:spPr>
+        <p:txBody>
+          <a:bodyPr wrap="none">
+            <a:spAutoFit/>
+          </a:bodyPr>
+          <a:lstStyle/>
+          <a:p>
+            <a:r>
+              <a:rPr lang="en-US" dirty="0"/>
+              <a:t>ROC Curve</a:t>
+            </a:r>
+          </a:p>
+        </p:txBody>
+      </p:sp>
+      <p:pic>
+        <p:nvPicPr>
+          <p:cNvPr id="10" name="Picture 9" descr="A close up of text on a white background&#10;&#10;Description automatically generated">
+            <a:extLst>
+              <a:ext uri="{FF2B5EF4-FFF2-40B4-BE49-F238E27FC236}">
+                <a16:creationId xmlns:a16="http://schemas.microsoft.com/office/drawing/2014/main" id="{93A8845B-FE7F-A84E-81FE-879962F8F2BC}"/>
+              </a:ext>
+            </a:extLst>
+          </p:cNvPr>
+          <p:cNvPicPr>
+            <a:picLocks noChangeAspect="1"/>
+          </p:cNvPicPr>
+          <p:nvPr/>
+        </p:nvPicPr>
+        <p:blipFill>
+          <a:blip r:embed="rId2"/>
+          <a:stretch>
+            <a:fillRect/>
+          </a:stretch>
+        </p:blipFill>
+        <p:spPr>
+          <a:xfrm>
+            <a:off x="890751" y="2320474"/>
+            <a:ext cx="3237643" cy="2225880"/>
+          </a:xfrm>
+          <a:prstGeom prst="rect">
+            <a:avLst/>
+          </a:prstGeom>
+        </p:spPr>
+      </p:pic>
+      <p:pic>
+        <p:nvPicPr>
+          <p:cNvPr id="14" name="Picture 13" descr="A close up of text on a white background&#10;&#10;Description automatically generated">
+            <a:extLst>
+              <a:ext uri="{FF2B5EF4-FFF2-40B4-BE49-F238E27FC236}">
+                <a16:creationId xmlns:a16="http://schemas.microsoft.com/office/drawing/2014/main" id="{3FD62262-EF9B-A648-9339-717AF1AE6F81}"/>
+              </a:ext>
+            </a:extLst>
+          </p:cNvPr>
+          <p:cNvPicPr>
+            <a:picLocks noChangeAspect="1"/>
+          </p:cNvPicPr>
+          <p:nvPr/>
+        </p:nvPicPr>
+        <p:blipFill>
+          <a:blip r:embed="rId3"/>
+          <a:stretch>
+            <a:fillRect/>
+          </a:stretch>
+        </p:blipFill>
+        <p:spPr>
+          <a:xfrm>
+            <a:off x="4962432" y="2316060"/>
+            <a:ext cx="3237643" cy="2225880"/>
+          </a:xfrm>
+          <a:prstGeom prst="rect">
+            <a:avLst/>
+          </a:prstGeom>
+        </p:spPr>
+      </p:pic>
     </p:spTree>
     <p:extLst>
       <p:ext uri="{BB962C8B-B14F-4D97-AF65-F5344CB8AC3E}">
-        <p14:creationId xmlns:p14="http://schemas.microsoft.com/office/powerpoint/2010/main" val="3044845807"/>
+        <p14:creationId xmlns:p14="http://schemas.microsoft.com/office/powerpoint/2010/main" val="2653269401"/>
       </p:ext>
     </p:extLst>
   </p:cSld>
   <p:clrMapOvr>
     <a:masterClrMapping/>
   </p:clrMapOvr>
-  <p:timing>
-    <p:tnLst>
-      <p:par>
-        <p:cTn id="1" dur="indefinite" restart="never" nodeType="tmRoot">
-          <p:childTnLst>
-            <p:seq concurrent="1" nextAc="seek">
-              <p:cTn id="2" dur="indefinite" nodeType="mainSeq">
-                <p:childTnLst>
-                  <p:par>
-                    <p:cTn id="3" fill="hold">
-                      <p:stCondLst>
-                        <p:cond delay="indefinite"/>
-                      </p:stCondLst>
-                      <p:childTnLst>
-                        <p:par>
-                          <p:cTn id="4" fill="hold">
-                            <p:stCondLst>
-                              <p:cond delay="0"/>
-                            </p:stCondLst>
-                            <p:childTnLst>
-                              <p:par>
-                                <p:cTn id="5" presetID="10" presetClass="entr" presetSubtype="0" fill="hold" nodeType="clickEffect">
-                                  <p:stCondLst>
-                                    <p:cond delay="0"/>
-                                  </p:stCondLst>
-                                  <p:childTnLst>
-                                    <p:set>
-                                      <p:cBhvr>
-                                        <p:cTn id="6" dur="1" fill="hold">
-                                          <p:stCondLst>
-                                            <p:cond delay="0"/>
-                                          </p:stCondLst>
-                                        </p:cTn>
-                                        <p:tgtEl>
-                                          <p:spTgt spid="6"/>
-                                        </p:tgtEl>
-                                        <p:attrNameLst>
-                                          <p:attrName>style.visibility</p:attrName>
-                                        </p:attrNameLst>
-                                      </p:cBhvr>
-                                      <p:to>
-                                        <p:strVal val="visible"/>
-                                      </p:to>
-                                    </p:set>
-                                    <p:animEffect transition="in" filter="fade">
-                                      <p:cBhvr>
-                                        <p:cTn id="7" dur="500"/>
-                                        <p:tgtEl>
-                                          <p:spTgt spid="6"/>
-                                        </p:tgtEl>
-                                      </p:cBhvr>
-                                    </p:animEffect>
-                                  </p:childTnLst>
-                                </p:cTn>
-                              </p:par>
-                              <p:par>
-                                <p:cTn id="8" presetID="10" presetClass="entr" presetSubtype="0" fill="hold" nodeType="withEffect">
-                                  <p:stCondLst>
-                                    <p:cond delay="0"/>
-                                  </p:stCondLst>
-                                  <p:childTnLst>
-                                    <p:set>
-                                      <p:cBhvr>
-                                        <p:cTn id="9" dur="1" fill="hold">
-                                          <p:stCondLst>
-                                            <p:cond delay="0"/>
-                                          </p:stCondLst>
-                                        </p:cTn>
-                                        <p:tgtEl>
-                                          <p:spTgt spid="11"/>
-                                        </p:tgtEl>
-                                        <p:attrNameLst>
-                                          <p:attrName>style.visibility</p:attrName>
-                                        </p:attrNameLst>
-                                      </p:cBhvr>
-                                      <p:to>
-                                        <p:strVal val="visible"/>
-                                      </p:to>
-                                    </p:set>
-                                    <p:animEffect transition="in" filter="fade">
-                                      <p:cBhvr>
-                                        <p:cTn id="10" dur="500"/>
-                                        <p:tgtEl>
-                                          <p:spTgt spid="11"/>
-                                        </p:tgtEl>
-                                      </p:cBhvr>
-                                    </p:animEffect>
-                                  </p:childTnLst>
-                                </p:cTn>
-                              </p:par>
-                              <p:par>
-                                <p:cTn id="11" presetID="10" presetClass="entr" presetSubtype="0" fill="hold" grpId="0" nodeType="withEffect">
-                                  <p:stCondLst>
-                                    <p:cond delay="0"/>
-                                  </p:stCondLst>
-                                  <p:childTnLst>
-                                    <p:set>
-                                      <p:cBhvr>
-                                        <p:cTn id="12" dur="1" fill="hold">
-                                          <p:stCondLst>
-                                            <p:cond delay="0"/>
-                                          </p:stCondLst>
-                                        </p:cTn>
-                                        <p:tgtEl>
-                                          <p:spTgt spid="14"/>
-                                        </p:tgtEl>
-                                        <p:attrNameLst>
-                                          <p:attrName>style.visibility</p:attrName>
-                                        </p:attrNameLst>
-                                      </p:cBhvr>
-                                      <p:to>
-                                        <p:strVal val="visible"/>
-                                      </p:to>
-                                    </p:set>
-                                    <p:animEffect transition="in" filter="fade">
-                                      <p:cBhvr>
-                                        <p:cTn id="13" dur="500"/>
-                                        <p:tgtEl>
-                                          <p:spTgt spid="14"/>
-                                        </p:tgtEl>
-                                      </p:cBhvr>
-                                    </p:animEffect>
-                                  </p:childTnLst>
-                                </p:cTn>
-                              </p:par>
-                              <p:par>
-                                <p:cTn id="14" presetID="10" presetClass="entr" presetSubtype="0" fill="hold" grpId="0" nodeType="withEffect">
-                                  <p:stCondLst>
-                                    <p:cond delay="0"/>
-                                  </p:stCondLst>
-                                  <p:childTnLst>
-                                    <p:set>
-                                      <p:cBhvr>
-                                        <p:cTn id="15" dur="1" fill="hold">
-                                          <p:stCondLst>
-                                            <p:cond delay="0"/>
-                                          </p:stCondLst>
-                                        </p:cTn>
-                                        <p:tgtEl>
-                                          <p:spTgt spid="15"/>
-                                        </p:tgtEl>
-                                        <p:attrNameLst>
-                                          <p:attrName>style.visibility</p:attrName>
-                                        </p:attrNameLst>
-                                      </p:cBhvr>
-                                      <p:to>
-                                        <p:strVal val="visible"/>
-                                      </p:to>
-                                    </p:set>
-                                    <p:animEffect transition="in" filter="fade">
-                                      <p:cBhvr>
-                                        <p:cTn id="16" dur="500"/>
-                                        <p:tgtEl>
-                                          <p:spTgt spid="15"/>
-                                        </p:tgtEl>
-                                      </p:cBhvr>
-                                    </p:animEffect>
-                                  </p:childTnLst>
-                                </p:cTn>
-                              </p:par>
-                              <p:par>
-                                <p:cTn id="17" presetID="10" presetClass="entr" presetSubtype="0" fill="hold" grpId="0" nodeType="withEffect">
-                                  <p:stCondLst>
-                                    <p:cond delay="0"/>
-                                  </p:stCondLst>
-                                  <p:childTnLst>
-                                    <p:set>
-                                      <p:cBhvr>
-                                        <p:cTn id="18" dur="1" fill="hold">
-                                          <p:stCondLst>
-                                            <p:cond delay="0"/>
-                                          </p:stCondLst>
-                                        </p:cTn>
-                                        <p:tgtEl>
-                                          <p:spTgt spid="7"/>
-                                        </p:tgtEl>
-                                        <p:attrNameLst>
-                                          <p:attrName>style.visibility</p:attrName>
-                                        </p:attrNameLst>
-                                      </p:cBhvr>
-                                      <p:to>
-                                        <p:strVal val="visible"/>
-                                      </p:to>
-                                    </p:set>
-                                    <p:animEffect transition="in" filter="fade">
-                                      <p:cBhvr>
-                                        <p:cTn id="19" dur="500"/>
-                                        <p:tgtEl>
-                                          <p:spTgt spid="7"/>
-                                        </p:tgtEl>
-                                      </p:cBhvr>
-                                    </p:animEffect>
-                                  </p:childTnLst>
-                                </p:cTn>
-                              </p:par>
-                            </p:childTnLst>
-                          </p:cTn>
-                        </p:par>
-                      </p:childTnLst>
-                    </p:cTn>
-                  </p:par>
-                  <p:par>
-                    <p:cTn id="20" fill="hold">
-                      <p:stCondLst>
-                        <p:cond delay="indefinite"/>
-                      </p:stCondLst>
-                      <p:childTnLst>
-                        <p:par>
-                          <p:cTn id="21" fill="hold">
-                            <p:stCondLst>
-                              <p:cond delay="0"/>
-                            </p:stCondLst>
-                            <p:childTnLst>
-                              <p:par>
-                                <p:cTn id="22" presetID="10" presetClass="entr" presetSubtype="0" fill="hold" nodeType="clickEffect">
-                                  <p:stCondLst>
-                                    <p:cond delay="0"/>
-                                  </p:stCondLst>
-                                  <p:childTnLst>
-                                    <p:set>
-                                      <p:cBhvr>
-                                        <p:cTn id="23" dur="1" fill="hold">
-                                          <p:stCondLst>
-                                            <p:cond delay="0"/>
-                                          </p:stCondLst>
-                                        </p:cTn>
-                                        <p:tgtEl>
-                                          <p:spTgt spid="13"/>
-                                        </p:tgtEl>
-                                        <p:attrNameLst>
-                                          <p:attrName>style.visibility</p:attrName>
-                                        </p:attrNameLst>
-                                      </p:cBhvr>
-                                      <p:to>
-                                        <p:strVal val="visible"/>
-                                      </p:to>
-                                    </p:set>
-                                    <p:animEffect transition="in" filter="fade">
-                                      <p:cBhvr>
-                                        <p:cTn id="24" dur="500"/>
-                                        <p:tgtEl>
-                                          <p:spTgt spid="13"/>
-                                        </p:tgtEl>
-                                      </p:cBhvr>
-                                    </p:animEffect>
-                                  </p:childTnLst>
-                                </p:cTn>
-                              </p:par>
-                            </p:childTnLst>
-                          </p:cTn>
-                        </p:par>
-                      </p:childTnLst>
-                    </p:cTn>
-                  </p:par>
-                </p:childTnLst>
-              </p:cTn>
-              <p:prevCondLst>
-                <p:cond evt="onPrev" delay="0">
-                  <p:tgtEl>
-                    <p:sldTgt/>
-                  </p:tgtEl>
-                </p:cond>
-              </p:prevCondLst>
-              <p:nextCondLst>
-                <p:cond evt="onNext" delay="0">
-                  <p:tgtEl>
-                    <p:sldTgt/>
-                  </p:tgtEl>
-                </p:cond>
-              </p:nextCondLst>
-            </p:seq>
-          </p:childTnLst>
-        </p:cTn>
-      </p:par>
-    </p:tnLst>
-    <p:bldLst>
-      <p:bldP spid="7" grpId="0"/>
-      <p:bldP spid="14" grpId="0"/>
-      <p:bldP spid="15" grpId="0"/>
-    </p:bldLst>
-  </p:timing>
 </p:sld>
 </file>
 

</xml_diff>